<commit_message>
add midterm 2 review answers
</commit_message>
<xml_diff>
--- a/slides/Week13-Midterm-review-2.pptx
+++ b/slides/Week13-Midterm-review-2.pptx
@@ -216,7 +216,7 @@
           <a:p>
             <a:fld id="{A0EF51DC-FFF8-B14E-9A81-DDA04A01B9C6}" type="datetimeFigureOut">
               <a:rPr lang="en-US" smtClean="0"/>
-              <a:t>4/10/23</a:t>
+              <a:t>4/11/23</a:t>
             </a:fld>
             <a:endParaRPr lang="en-US"/>
           </a:p>
@@ -1937,7 +1937,7 @@
           <a:p>
             <a:fld id="{951F334E-BB0B-2F4C-860B-AB91C4AFDE55}" type="datetimeFigureOut">
               <a:rPr lang="en-US" smtClean="0"/>
-              <a:t>4/10/23</a:t>
+              <a:t>4/11/23</a:t>
             </a:fld>
             <a:endParaRPr lang="en-US"/>
           </a:p>
@@ -2135,7 +2135,7 @@
           <a:p>
             <a:fld id="{951F334E-BB0B-2F4C-860B-AB91C4AFDE55}" type="datetimeFigureOut">
               <a:rPr lang="en-US" smtClean="0"/>
-              <a:t>4/10/23</a:t>
+              <a:t>4/11/23</a:t>
             </a:fld>
             <a:endParaRPr lang="en-US"/>
           </a:p>
@@ -2343,7 +2343,7 @@
           <a:p>
             <a:fld id="{951F334E-BB0B-2F4C-860B-AB91C4AFDE55}" type="datetimeFigureOut">
               <a:rPr lang="en-US" smtClean="0"/>
-              <a:t>4/10/23</a:t>
+              <a:t>4/11/23</a:t>
             </a:fld>
             <a:endParaRPr lang="en-US"/>
           </a:p>
@@ -2541,7 +2541,7 @@
           <a:p>
             <a:fld id="{951F334E-BB0B-2F4C-860B-AB91C4AFDE55}" type="datetimeFigureOut">
               <a:rPr lang="en-US" smtClean="0"/>
-              <a:t>4/10/23</a:t>
+              <a:t>4/11/23</a:t>
             </a:fld>
             <a:endParaRPr lang="en-US"/>
           </a:p>
@@ -2816,7 +2816,7 @@
           <a:p>
             <a:fld id="{951F334E-BB0B-2F4C-860B-AB91C4AFDE55}" type="datetimeFigureOut">
               <a:rPr lang="en-US" smtClean="0"/>
-              <a:t>4/10/23</a:t>
+              <a:t>4/11/23</a:t>
             </a:fld>
             <a:endParaRPr lang="en-US"/>
           </a:p>
@@ -3081,7 +3081,7 @@
           <a:p>
             <a:fld id="{951F334E-BB0B-2F4C-860B-AB91C4AFDE55}" type="datetimeFigureOut">
               <a:rPr lang="en-US" smtClean="0"/>
-              <a:t>4/10/23</a:t>
+              <a:t>4/11/23</a:t>
             </a:fld>
             <a:endParaRPr lang="en-US"/>
           </a:p>
@@ -3493,7 +3493,7 @@
           <a:p>
             <a:fld id="{951F334E-BB0B-2F4C-860B-AB91C4AFDE55}" type="datetimeFigureOut">
               <a:rPr lang="en-US" smtClean="0"/>
-              <a:t>4/10/23</a:t>
+              <a:t>4/11/23</a:t>
             </a:fld>
             <a:endParaRPr lang="en-US"/>
           </a:p>
@@ -3634,7 +3634,7 @@
           <a:p>
             <a:fld id="{951F334E-BB0B-2F4C-860B-AB91C4AFDE55}" type="datetimeFigureOut">
               <a:rPr lang="en-US" smtClean="0"/>
-              <a:t>4/10/23</a:t>
+              <a:t>4/11/23</a:t>
             </a:fld>
             <a:endParaRPr lang="en-US"/>
           </a:p>
@@ -3747,7 +3747,7 @@
           <a:p>
             <a:fld id="{951F334E-BB0B-2F4C-860B-AB91C4AFDE55}" type="datetimeFigureOut">
               <a:rPr lang="en-US" smtClean="0"/>
-              <a:t>4/10/23</a:t>
+              <a:t>4/11/23</a:t>
             </a:fld>
             <a:endParaRPr lang="en-US"/>
           </a:p>
@@ -4058,7 +4058,7 @@
           <a:p>
             <a:fld id="{951F334E-BB0B-2F4C-860B-AB91C4AFDE55}" type="datetimeFigureOut">
               <a:rPr lang="en-US" smtClean="0"/>
-              <a:t>4/10/23</a:t>
+              <a:t>4/11/23</a:t>
             </a:fld>
             <a:endParaRPr lang="en-US"/>
           </a:p>
@@ -4346,7 +4346,7 @@
           <a:p>
             <a:fld id="{951F334E-BB0B-2F4C-860B-AB91C4AFDE55}" type="datetimeFigureOut">
               <a:rPr lang="en-US" smtClean="0"/>
-              <a:t>4/10/23</a:t>
+              <a:t>4/11/23</a:t>
             </a:fld>
             <a:endParaRPr lang="en-US"/>
           </a:p>
@@ -4587,7 +4587,7 @@
           <a:p>
             <a:fld id="{951F334E-BB0B-2F4C-860B-AB91C4AFDE55}" type="datetimeFigureOut">
               <a:rPr lang="en-US" smtClean="0"/>
-              <a:t>4/10/23</a:t>
+              <a:t>4/11/23</a:t>
             </a:fld>
             <a:endParaRPr lang="en-US"/>
           </a:p>
@@ -5679,10 +5679,10 @@
       </p:sp>
       <p:pic>
         <p:nvPicPr>
-          <p:cNvPr id="5" name="Picture 4">
-            <a:extLst>
-              <a:ext uri="{FF2B5EF4-FFF2-40B4-BE49-F238E27FC236}">
-                <a16:creationId xmlns:a16="http://schemas.microsoft.com/office/drawing/2014/main" id="{55B0443C-A5A1-B042-AA54-F6753C37F0E1}"/>
+          <p:cNvPr id="4" name="Picture 3">
+            <a:extLst>
+              <a:ext uri="{FF2B5EF4-FFF2-40B4-BE49-F238E27FC236}">
+                <a16:creationId xmlns:a16="http://schemas.microsoft.com/office/drawing/2014/main" id="{099868CA-A8EC-AAC9-3773-681D9B9E21F0}"/>
               </a:ext>
             </a:extLst>
           </p:cNvPr>
@@ -5692,7 +5692,7 @@
           <p:nvPr/>
         </p:nvPicPr>
         <p:blipFill>
-          <a:blip/>
+          <a:blip r:embed="rId2"/>
           <a:stretch>
             <a:fillRect/>
           </a:stretch>
@@ -6179,36 +6179,6 @@
           </a:p>
         </p:txBody>
       </p:sp>
-      <p:pic>
-        <p:nvPicPr>
-          <p:cNvPr id="5" name="Picture 4">
-            <a:extLst>
-              <a:ext uri="{FF2B5EF4-FFF2-40B4-BE49-F238E27FC236}">
-                <a16:creationId xmlns:a16="http://schemas.microsoft.com/office/drawing/2014/main" id="{30965C79-9A62-B347-9F20-55815F208462}"/>
-              </a:ext>
-            </a:extLst>
-          </p:cNvPr>
-          <p:cNvPicPr>
-            <a:picLocks noChangeAspect="1"/>
-          </p:cNvPicPr>
-          <p:nvPr/>
-        </p:nvPicPr>
-        <p:blipFill>
-          <a:blip/>
-          <a:stretch>
-            <a:fillRect/>
-          </a:stretch>
-        </p:blipFill>
-        <p:spPr>
-          <a:xfrm>
-            <a:off x="3159578" y="1519283"/>
-            <a:ext cx="1586594" cy="723141"/>
-          </a:xfrm>
-          <a:prstGeom prst="rect">
-            <a:avLst/>
-          </a:prstGeom>
-        </p:spPr>
-      </p:pic>
       <p:sp>
         <p:nvSpPr>
           <p:cNvPr id="6" name="Title 1">
@@ -6262,6 +6232,36 @@
           </a:p>
         </p:txBody>
       </p:sp>
+      <p:pic>
+        <p:nvPicPr>
+          <p:cNvPr id="2" name="Picture 1">
+            <a:extLst>
+              <a:ext uri="{FF2B5EF4-FFF2-40B4-BE49-F238E27FC236}">
+                <a16:creationId xmlns:a16="http://schemas.microsoft.com/office/drawing/2014/main" id="{672B537A-D230-6B38-1327-3BE8C59F6D76}"/>
+              </a:ext>
+            </a:extLst>
+          </p:cNvPr>
+          <p:cNvPicPr>
+            <a:picLocks noChangeAspect="1"/>
+          </p:cNvPicPr>
+          <p:nvPr/>
+        </p:nvPicPr>
+        <p:blipFill>
+          <a:blip r:embed="rId2"/>
+          <a:stretch>
+            <a:fillRect/>
+          </a:stretch>
+        </p:blipFill>
+        <p:spPr>
+          <a:xfrm>
+            <a:off x="3159578" y="1519283"/>
+            <a:ext cx="1586594" cy="723141"/>
+          </a:xfrm>
+          <a:prstGeom prst="rect">
+            <a:avLst/>
+          </a:prstGeom>
+        </p:spPr>
+      </p:pic>
     </p:spTree>
     <p:extLst>
       <p:ext uri="{BB962C8B-B14F-4D97-AF65-F5344CB8AC3E}">

</xml_diff>